<commit_message>
Created presentation template, changed starting value of color variables to none.
</commit_message>
<xml_diff>
--- a/docs/postertemplate.pptx
+++ b/docs/postertemplate.pptx
@@ -3084,7 +3084,7 @@
     <p:bg>
       <p:bgPr>
         <a:solidFill>
-          <a:srgbClr val="82D1EB"/>
+          <a:srgbClr val="FF8000"/>
         </a:solidFill>
         <a:effectLst/>
       </p:bgPr>
@@ -3124,7 +3124,7 @@
             <a:r>
               <a:rPr sz="7200" b="1">
                 <a:solidFill>
-                  <a:srgbClr val="7D2E14"/>
+                  <a:srgbClr val="FF9000"/>
                 </a:solidFill>
               </a:rPr>
               <a:t>Title and Names Here</a:t>
@@ -3147,7 +3147,7 @@
             <a:avLst/>
           </a:prstGeom>
           <a:solidFill>
-            <a:srgbClr val="7D2E14"/>
+            <a:srgbClr val="FF9F00"/>
           </a:solidFill>
         </p:spPr>
         <p:txBody>
@@ -3194,7 +3194,7 @@
           <a:p>
             <a:pPr>
               <a:buChar char="•"/>
-              <a:defRPr sz="2000">
+              <a:defRPr sz="2500">
                 <a:solidFill>
                   <a:srgbClr val="000000"/>
                 </a:solidFill>
@@ -3207,7 +3207,7 @@
           <a:p>
             <a:pPr>
               <a:buChar char="•"/>
-              <a:defRPr sz="2000">
+              <a:defRPr sz="2500">
                 <a:solidFill>
                   <a:srgbClr val="000000"/>
                 </a:solidFill>
@@ -3220,7 +3220,7 @@
           <a:p>
             <a:pPr>
               <a:buChar char="•"/>
-              <a:defRPr sz="2000">
+              <a:defRPr sz="2500">
                 <a:solidFill>
                   <a:srgbClr val="000000"/>
                 </a:solidFill>
@@ -3247,7 +3247,7 @@
             <a:avLst/>
           </a:prstGeom>
           <a:solidFill>
-            <a:srgbClr val="7D2E14"/>
+            <a:srgbClr val="FF9F00"/>
           </a:solidFill>
         </p:spPr>
         <p:txBody>
@@ -3294,7 +3294,7 @@
           <a:p>
             <a:pPr>
               <a:buChar char="•"/>
-              <a:defRPr sz="2000">
+              <a:defRPr sz="2500">
                 <a:solidFill>
                   <a:srgbClr val="000000"/>
                 </a:solidFill>
@@ -3307,7 +3307,7 @@
           <a:p>
             <a:pPr>
               <a:buChar char="•"/>
-              <a:defRPr sz="2000">
+              <a:defRPr sz="2500">
                 <a:solidFill>
                   <a:srgbClr val="000000"/>
                 </a:solidFill>
@@ -3320,7 +3320,7 @@
           <a:p>
             <a:pPr>
               <a:buChar char="•"/>
-              <a:defRPr sz="2000">
+              <a:defRPr sz="2500">
                 <a:solidFill>
                   <a:srgbClr val="000000"/>
                 </a:solidFill>
@@ -3347,7 +3347,7 @@
             <a:avLst/>
           </a:prstGeom>
           <a:solidFill>
-            <a:srgbClr val="7D2E14"/>
+            <a:srgbClr val="FF9F00"/>
           </a:solidFill>
         </p:spPr>
         <p:txBody>
@@ -3402,6 +3402,39 @@
         </p:nvSpPr>
         <p:spPr>
           <a:xfrm>
+            <a:off x="11887200" y="5029200"/>
+            <a:ext cx="8229600" cy="914400"/>
+          </a:xfrm>
+          <a:prstGeom prst="rect">
+            <a:avLst/>
+          </a:prstGeom>
+          <a:noFill/>
+        </p:spPr>
+        <p:txBody>
+          <a:bodyPr wrap="none">
+            <a:spAutoFit/>
+          </a:bodyPr>
+          <a:lstStyle/>
+          <a:p>
+            <a:r>
+              <a:rPr sz="3800" b="1">
+                <a:solidFill>
+                  <a:srgbClr val="FF9000"/>
+                </a:solidFill>
+              </a:rPr>
+              <a:t>Use the third color for accents and highlights</a:t>
+            </a:r>
+          </a:p>
+        </p:txBody>
+      </p:sp>
+      <p:sp>
+        <p:nvSpPr>
+          <p:cNvPr id="10" name="TextBox 9"/>
+          <p:cNvSpPr txBox="1"/>
+          <p:nvPr/>
+        </p:nvSpPr>
+        <p:spPr>
+          <a:xfrm>
             <a:off x="22219920" y="3749039"/>
             <a:ext cx="10058400" cy="640080"/>
           </a:xfrm>
@@ -3409,7 +3442,7 @@
             <a:avLst/>
           </a:prstGeom>
           <a:solidFill>
-            <a:srgbClr val="7D2E14"/>
+            <a:srgbClr val="FF9F00"/>
           </a:solidFill>
         </p:spPr>
         <p:txBody>
@@ -3432,7 +3465,7 @@
       </p:sp>
       <p:sp>
         <p:nvSpPr>
-          <p:cNvPr id="10" name="TextBox 9"/>
+          <p:cNvPr id="11" name="TextBox 10"/>
           <p:cNvSpPr txBox="1"/>
           <p:nvPr/>
         </p:nvSpPr>
@@ -3456,7 +3489,7 @@
           <a:p>
             <a:pPr>
               <a:buChar char="•"/>
-              <a:defRPr sz="2000">
+              <a:defRPr sz="2500">
                 <a:solidFill>
                   <a:srgbClr val="000000"/>
                 </a:solidFill>
@@ -3469,7 +3502,7 @@
           <a:p>
             <a:pPr>
               <a:buChar char="•"/>
-              <a:defRPr sz="2000">
+              <a:defRPr sz="2500">
                 <a:solidFill>
                   <a:srgbClr val="000000"/>
                 </a:solidFill>
@@ -3482,7 +3515,7 @@
           <a:p>
             <a:pPr>
               <a:buChar char="•"/>
-              <a:defRPr sz="2000">
+              <a:defRPr sz="2500">
                 <a:solidFill>
                   <a:srgbClr val="000000"/>
                 </a:solidFill>
@@ -3496,7 +3529,7 @@
       </p:sp>
       <p:sp>
         <p:nvSpPr>
-          <p:cNvPr id="11" name="TextBox 10"/>
+          <p:cNvPr id="12" name="TextBox 11"/>
           <p:cNvSpPr txBox="1"/>
           <p:nvPr/>
         </p:nvSpPr>
@@ -3509,7 +3542,7 @@
             <a:avLst/>
           </a:prstGeom>
           <a:solidFill>
-            <a:srgbClr val="7D2E14"/>
+            <a:srgbClr val="FF9000"/>
           </a:solidFill>
         </p:spPr>
         <p:txBody>
@@ -3532,7 +3565,7 @@
       </p:sp>
       <p:sp>
         <p:nvSpPr>
-          <p:cNvPr id="12" name="TextBox 11"/>
+          <p:cNvPr id="13" name="TextBox 12"/>
           <p:cNvSpPr txBox="1"/>
           <p:nvPr/>
         </p:nvSpPr>
@@ -3558,7 +3591,7 @@
       </p:sp>
       <p:sp>
         <p:nvSpPr>
-          <p:cNvPr id="13" name="TextBox 12"/>
+          <p:cNvPr id="14" name="TextBox 13"/>
           <p:cNvSpPr txBox="1"/>
           <p:nvPr/>
         </p:nvSpPr>
@@ -3571,7 +3604,7 @@
             <a:avLst/>
           </a:prstGeom>
           <a:solidFill>
-            <a:srgbClr val="7D2E14"/>
+            <a:srgbClr val="FF9F00"/>
           </a:solidFill>
         </p:spPr>
         <p:txBody>

</xml_diff>